<commit_message>
Update PowerPoint template processing and directives
This commit introduces significant updates to the PowerPoint template processing application using the DocuChef library. Key changes include:

- Switched the template file from `template_1.pptx` to `template_2.pptx` and reduced the item processing loop from 25 to 3.
- Added a new `template_2.pptx` with additional slides and updated content.
- Improved directive handling for `foreach` and `if`, enhancing slide generation flexibility.
- Enhanced expression evaluation logic for better handling of formatted expressions and array indexing.
- Introduced a new helper class for efficient text processing in slides.
- Added extensive logging for better insights into processing steps and error handling.
- Updated documentation to reflect new features and directive changes.
</commit_message>
<xml_diff>
--- a/src/DocuChef.TestConsoleApp/files/ppt/template_1.pptx
+++ b/src/DocuChef.TestConsoleApp/files/ppt/template_1.pptx
@@ -5,11 +5,10 @@
     <p:sldMasterId id="2147483648" r:id="rId1"/>
   </p:sldMasterIdLst>
   <p:notesMasterIdLst>
-    <p:notesMasterId r:id="rId4"/>
+    <p:notesMasterId r:id="rId3"/>
   </p:notesMasterIdLst>
   <p:sldIdLst>
     <p:sldId id="256" r:id="rId2"/>
-    <p:sldId id="257" r:id="rId3"/>
   </p:sldIdLst>
   <p:sldSz cx="12192000" cy="6858000"/>
   <p:notesSz cx="6858000" cy="9144000"/>
@@ -540,94 +539,6 @@
     <p:extLst>
       <p:ext uri="{BB962C8B-B14F-4D97-AF65-F5344CB8AC3E}">
         <p14:creationId xmlns:p14="http://schemas.microsoft.com/office/powerpoint/2010/main" val="3930610481"/>
-      </p:ext>
-    </p:extLst>
-  </p:cSld>
-  <p:clrMapOvr>
-    <a:masterClrMapping/>
-  </p:clrMapOvr>
-</p:notes>
-</file>
-
-<file path=ppt/notesSlides/notesSlide2.xml><?xml version="1.0" encoding="utf-8"?>
-<p:notes xmlns:a="http://schemas.openxmlformats.org/drawingml/2006/main" xmlns:r="http://schemas.openxmlformats.org/officeDocument/2006/relationships" xmlns:p="http://schemas.openxmlformats.org/presentationml/2006/main">
-  <p:cSld>
-    <p:spTree>
-      <p:nvGrpSpPr>
-        <p:cNvPr id="1" name=""/>
-        <p:cNvGrpSpPr/>
-        <p:nvPr/>
-      </p:nvGrpSpPr>
-      <p:grpSpPr>
-        <a:xfrm>
-          <a:off x="0" y="0"/>
-          <a:ext cx="0" cy="0"/>
-          <a:chOff x="0" y="0"/>
-          <a:chExt cx="0" cy="0"/>
-        </a:xfrm>
-      </p:grpSpPr>
-      <p:sp>
-        <p:nvSpPr>
-          <p:cNvPr id="2" name="슬라이드 이미지 개체 틀 1"/>
-          <p:cNvSpPr>
-            <a:spLocks noGrp="1" noRot="1" noChangeAspect="1"/>
-          </p:cNvSpPr>
-          <p:nvPr>
-            <p:ph type="sldImg"/>
-          </p:nvPr>
-        </p:nvSpPr>
-        <p:spPr/>
-      </p:sp>
-      <p:sp>
-        <p:nvSpPr>
-          <p:cNvPr id="3" name="슬라이드 노트 개체 틀 2"/>
-          <p:cNvSpPr>
-            <a:spLocks noGrp="1"/>
-          </p:cNvSpPr>
-          <p:nvPr>
-            <p:ph type="body" idx="1"/>
-          </p:nvPr>
-        </p:nvSpPr>
-        <p:spPr/>
-        <p:txBody>
-          <a:bodyPr/>
-          <a:lstStyle/>
-          <a:p>
-            <a:r>
-              <a:rPr lang="en-US" altLang="ko-KR"/>
-              <a:t>#slide-foreach: Items as item, maxItems: 10</a:t>
-            </a:r>
-            <a:endParaRPr lang="ko-KR" altLang="en-US"/>
-          </a:p>
-        </p:txBody>
-      </p:sp>
-      <p:sp>
-        <p:nvSpPr>
-          <p:cNvPr id="4" name="슬라이드 번호 개체 틀 3"/>
-          <p:cNvSpPr>
-            <a:spLocks noGrp="1"/>
-          </p:cNvSpPr>
-          <p:nvPr>
-            <p:ph type="sldNum" sz="quarter" idx="5"/>
-          </p:nvPr>
-        </p:nvSpPr>
-        <p:spPr/>
-        <p:txBody>
-          <a:bodyPr/>
-          <a:lstStyle/>
-          <a:p>
-            <a:fld id="{722EC4C2-401E-4FFE-A4F4-BC5B5DD99166}" type="slidenum">
-              <a:rPr lang="ko-KR" altLang="en-US" smtClean="0"/>
-              <a:t>2</a:t>
-            </a:fld>
-            <a:endParaRPr lang="ko-KR" altLang="en-US"/>
-          </a:p>
-        </p:txBody>
-      </p:sp>
-    </p:spTree>
-    <p:extLst>
-      <p:ext uri="{BB962C8B-B14F-4D97-AF65-F5344CB8AC3E}">
-        <p14:creationId xmlns:p14="http://schemas.microsoft.com/office/powerpoint/2010/main" val="3101731660"/>
       </p:ext>
     </p:extLst>
   </p:cSld>
@@ -3903,7 +3814,12 @@
             <p:ph type="subTitle" idx="1"/>
           </p:nvPr>
         </p:nvSpPr>
-        <p:spPr/>
+        <p:spPr>
+          <a:xfrm>
+            <a:off x="1524000" y="3584785"/>
+            <a:ext cx="9144000" cy="1655762"/>
+          </a:xfrm>
+        </p:spPr>
         <p:txBody>
           <a:bodyPr/>
           <a:lstStyle/>
@@ -3930,8 +3846,8 @@
         </p:nvSpPr>
         <p:spPr>
           <a:xfrm>
-            <a:off x="8219251" y="6222233"/>
-            <a:ext cx="3609578" cy="369332"/>
+            <a:off x="6970426" y="6222233"/>
+            <a:ext cx="4858403" cy="369332"/>
           </a:xfrm>
           <a:prstGeom prst="rect">
             <a:avLst/>
@@ -3939,17 +3855,17 @@
           <a:noFill/>
         </p:spPr>
         <p:txBody>
-          <a:bodyPr wrap="none" rtlCol="0">
+          <a:bodyPr wrap="square" rtlCol="0">
             <a:spAutoFit/>
           </a:bodyPr>
           <a:lstStyle/>
           <a:p>
             <a:pPr algn="r"/>
             <a:r>
-              <a:rPr lang="en-US" altLang="ko-KR"/>
+              <a:rPr lang="en-US" altLang="ko-KR" b="1" i="1"/>
               <a:t>Created By: ${Date:yyyy-MM-dd}</a:t>
             </a:r>
-            <a:endParaRPr lang="ko-KR" altLang="en-US"/>
+            <a:endParaRPr lang="ko-KR" altLang="en-US" b="1" i="1"/>
           </a:p>
         </p:txBody>
       </p:sp>
@@ -4018,183 +3934,6 @@
     <p:extLst>
       <p:ext uri="{BB962C8B-B14F-4D97-AF65-F5344CB8AC3E}">
         <p14:creationId xmlns:p14="http://schemas.microsoft.com/office/powerpoint/2010/main" val="3979925072"/>
-      </p:ext>
-    </p:extLst>
-  </p:cSld>
-  <p:clrMapOvr>
-    <a:masterClrMapping/>
-  </p:clrMapOvr>
-</p:sld>
-</file>
-
-<file path=ppt/slides/slide2.xml><?xml version="1.0" encoding="utf-8"?>
-<p:sld xmlns:a="http://schemas.openxmlformats.org/drawingml/2006/main" xmlns:r="http://schemas.openxmlformats.org/officeDocument/2006/relationships" xmlns:p="http://schemas.openxmlformats.org/presentationml/2006/main">
-  <p:cSld>
-    <p:spTree>
-      <p:nvGrpSpPr>
-        <p:cNvPr id="1" name=""/>
-        <p:cNvGrpSpPr/>
-        <p:nvPr/>
-      </p:nvGrpSpPr>
-      <p:grpSpPr>
-        <a:xfrm>
-          <a:off x="0" y="0"/>
-          <a:ext cx="0" cy="0"/>
-          <a:chOff x="0" y="0"/>
-          <a:chExt cx="0" cy="0"/>
-        </a:xfrm>
-      </p:grpSpPr>
-      <p:sp>
-        <p:nvSpPr>
-          <p:cNvPr id="5" name="TextBox 4">
-            <a:extLst>
-              <a:ext uri="{FF2B5EF4-FFF2-40B4-BE49-F238E27FC236}">
-                <a16:creationId xmlns:a16="http://schemas.microsoft.com/office/drawing/2014/main" id="{A9B3DA27-DF8E-BD9F-3479-92446901D481}"/>
-              </a:ext>
-            </a:extLst>
-          </p:cNvPr>
-          <p:cNvSpPr txBox="1"/>
-          <p:nvPr/>
-        </p:nvSpPr>
-        <p:spPr>
-          <a:xfrm>
-            <a:off x="8085908" y="217323"/>
-            <a:ext cx="3801291" cy="369332"/>
-          </a:xfrm>
-          <a:prstGeom prst="rect">
-            <a:avLst/>
-          </a:prstGeom>
-          <a:noFill/>
-        </p:spPr>
-        <p:txBody>
-          <a:bodyPr wrap="square" rtlCol="0">
-            <a:spAutoFit/>
-          </a:bodyPr>
-          <a:lstStyle/>
-          <a:p>
-            <a:pPr algn="r"/>
-            <a:r>
-              <a:rPr lang="en-US" altLang="ko-KR" b="1" i="1"/>
-              <a:t>${CompanyName}</a:t>
-            </a:r>
-            <a:endParaRPr lang="ko-KR" altLang="en-US" b="1" i="1"/>
-          </a:p>
-        </p:txBody>
-      </p:sp>
-      <p:sp>
-        <p:nvSpPr>
-          <p:cNvPr id="6" name="직사각형 5">
-            <a:extLst>
-              <a:ext uri="{FF2B5EF4-FFF2-40B4-BE49-F238E27FC236}">
-                <a16:creationId xmlns:a16="http://schemas.microsoft.com/office/drawing/2014/main" id="{25D14B4C-0F72-CDD6-EA3C-CFB576AFB7CD}"/>
-              </a:ext>
-            </a:extLst>
-          </p:cNvPr>
-          <p:cNvSpPr/>
-          <p:nvPr/>
-        </p:nvSpPr>
-        <p:spPr>
-          <a:xfrm>
-            <a:off x="313509" y="1436914"/>
-            <a:ext cx="11573690" cy="5218613"/>
-          </a:xfrm>
-          <a:prstGeom prst="rect">
-            <a:avLst/>
-          </a:prstGeom>
-        </p:spPr>
-        <p:style>
-          <a:lnRef idx="2">
-            <a:schemeClr val="accent2"/>
-          </a:lnRef>
-          <a:fillRef idx="1">
-            <a:schemeClr val="lt1"/>
-          </a:fillRef>
-          <a:effectRef idx="0">
-            <a:schemeClr val="accent2"/>
-          </a:effectRef>
-          <a:fontRef idx="minor">
-            <a:schemeClr val="dk1"/>
-          </a:fontRef>
-        </p:style>
-        <p:txBody>
-          <a:bodyPr rtlCol="0" anchor="t"/>
-          <a:lstStyle/>
-          <a:p>
-            <a:r>
-              <a:rPr lang="en-US" altLang="ko-KR"/>
-              <a:t>${item.id}. ${item.name} - ${item.description}</a:t>
-            </a:r>
-          </a:p>
-          <a:p>
-            <a:r>
-              <a:rPr lang="ko-KR" altLang="en-US"/>
-              <a:t>가격</a:t>
-            </a:r>
-            <a:r>
-              <a:rPr lang="en-US" altLang="ko-KR"/>
-              <a:t>: ${item.price:C0}</a:t>
-            </a:r>
-            <a:r>
-              <a:rPr lang="ko-KR" altLang="en-US"/>
-              <a:t>원</a:t>
-            </a:r>
-          </a:p>
-        </p:txBody>
-      </p:sp>
-      <p:sp>
-        <p:nvSpPr>
-          <p:cNvPr id="2" name="직사각형 1">
-            <a:extLst>
-              <a:ext uri="{FF2B5EF4-FFF2-40B4-BE49-F238E27FC236}">
-                <a16:creationId xmlns:a16="http://schemas.microsoft.com/office/drawing/2014/main" id="{C894DA81-9336-179E-0E3F-245EDAEBDB41}"/>
-              </a:ext>
-            </a:extLst>
-          </p:cNvPr>
-          <p:cNvSpPr/>
-          <p:nvPr/>
-        </p:nvSpPr>
-        <p:spPr>
-          <a:xfrm>
-            <a:off x="396815" y="270293"/>
-            <a:ext cx="1213449" cy="954657"/>
-          </a:xfrm>
-          <a:prstGeom prst="rect">
-            <a:avLst/>
-          </a:prstGeom>
-        </p:spPr>
-        <p:style>
-          <a:lnRef idx="2">
-            <a:schemeClr val="accent1">
-              <a:shade val="15000"/>
-            </a:schemeClr>
-          </a:lnRef>
-          <a:fillRef idx="1">
-            <a:schemeClr val="accent1"/>
-          </a:fillRef>
-          <a:effectRef idx="0">
-            <a:schemeClr val="accent1"/>
-          </a:effectRef>
-          <a:fontRef idx="minor">
-            <a:schemeClr val="lt1"/>
-          </a:fontRef>
-        </p:style>
-        <p:txBody>
-          <a:bodyPr rtlCol="0" anchor="ctr"/>
-          <a:lstStyle/>
-          <a:p>
-            <a:pPr algn="ctr"/>
-            <a:r>
-              <a:rPr lang="en-US" altLang="ko-KR" sz="1200"/>
-              <a:t>${ppt.Image("LogoPath")}</a:t>
-            </a:r>
-            <a:endParaRPr lang="ko-KR" altLang="en-US" sz="1200"/>
-          </a:p>
-        </p:txBody>
-      </p:sp>
-    </p:spTree>
-    <p:extLst>
-      <p:ext uri="{BB962C8B-B14F-4D97-AF65-F5344CB8AC3E}">
-        <p14:creationId xmlns:p14="http://schemas.microsoft.com/office/powerpoint/2010/main" val="1405707576"/>
       </p:ext>
     </p:extLst>
   </p:cSld>

</xml_diff>

<commit_message>
Enhance PowerPoint processing and presentation content
Updated item processing in `Program.cs` to allow 13 items, with improved subtitle formatting. Enhanced slide duplication in `PowerPointProcessor.Array.cs` for better array handling and introduced `PowerPointProcessor.SlideCloning.cs` for cloning slides while preserving relationships. Removed the old duplication method in `PowerPointProcessor.Directive.cs`. Modified various XML files to ensure consistent presentation styles and updated PowerPoint templates to reflect new content. Deleted unnecessary `thumbnail.jpeg` file and updated metadata in `app.xml` and `core.xml`.
</commit_message>
<xml_diff>
--- a/src/DocuChef.TestConsoleApp/files/ppt/template_1.pptx
+++ b/src/DocuChef.TestConsoleApp/files/ppt/template_1.pptx
@@ -197,7 +197,7 @@
           <a:p>
             <a:fld id="{67FA9472-1DC2-476D-847D-AEF869A08B54}" type="datetimeFigureOut">
               <a:rPr lang="ko-KR" altLang="en-US" smtClean="0"/>
-              <a:t>2025-05-09</a:t>
+              <a:t>2025-05-10</a:t>
             </a:fld>
             <a:endParaRPr lang="ko-KR" altLang="en-US"/>
           </a:p>
@@ -695,7 +695,7 @@
           <a:p>
             <a:fld id="{1BA27EB7-94DC-414F-A9E6-532764B50347}" type="datetimeFigureOut">
               <a:rPr lang="ko-KR" altLang="en-US" smtClean="0"/>
-              <a:t>2025-05-09</a:t>
+              <a:t>2025-05-10</a:t>
             </a:fld>
             <a:endParaRPr lang="ko-KR" altLang="en-US"/>
           </a:p>
@@ -893,7 +893,7 @@
           <a:p>
             <a:fld id="{1BA27EB7-94DC-414F-A9E6-532764B50347}" type="datetimeFigureOut">
               <a:rPr lang="ko-KR" altLang="en-US" smtClean="0"/>
-              <a:t>2025-05-09</a:t>
+              <a:t>2025-05-10</a:t>
             </a:fld>
             <a:endParaRPr lang="ko-KR" altLang="en-US"/>
           </a:p>
@@ -1101,7 +1101,7 @@
           <a:p>
             <a:fld id="{1BA27EB7-94DC-414F-A9E6-532764B50347}" type="datetimeFigureOut">
               <a:rPr lang="ko-KR" altLang="en-US" smtClean="0"/>
-              <a:t>2025-05-09</a:t>
+              <a:t>2025-05-10</a:t>
             </a:fld>
             <a:endParaRPr lang="ko-KR" altLang="en-US"/>
           </a:p>
@@ -1299,7 +1299,7 @@
           <a:p>
             <a:fld id="{1BA27EB7-94DC-414F-A9E6-532764B50347}" type="datetimeFigureOut">
               <a:rPr lang="ko-KR" altLang="en-US" smtClean="0"/>
-              <a:t>2025-05-09</a:t>
+              <a:t>2025-05-10</a:t>
             </a:fld>
             <a:endParaRPr lang="ko-KR" altLang="en-US"/>
           </a:p>
@@ -1574,7 +1574,7 @@
           <a:p>
             <a:fld id="{1BA27EB7-94DC-414F-A9E6-532764B50347}" type="datetimeFigureOut">
               <a:rPr lang="ko-KR" altLang="en-US" smtClean="0"/>
-              <a:t>2025-05-09</a:t>
+              <a:t>2025-05-10</a:t>
             </a:fld>
             <a:endParaRPr lang="ko-KR" altLang="en-US"/>
           </a:p>
@@ -1839,7 +1839,7 @@
           <a:p>
             <a:fld id="{1BA27EB7-94DC-414F-A9E6-532764B50347}" type="datetimeFigureOut">
               <a:rPr lang="ko-KR" altLang="en-US" smtClean="0"/>
-              <a:t>2025-05-09</a:t>
+              <a:t>2025-05-10</a:t>
             </a:fld>
             <a:endParaRPr lang="ko-KR" altLang="en-US"/>
           </a:p>
@@ -2251,7 +2251,7 @@
           <a:p>
             <a:fld id="{1BA27EB7-94DC-414F-A9E6-532764B50347}" type="datetimeFigureOut">
               <a:rPr lang="ko-KR" altLang="en-US" smtClean="0"/>
-              <a:t>2025-05-09</a:t>
+              <a:t>2025-05-10</a:t>
             </a:fld>
             <a:endParaRPr lang="ko-KR" altLang="en-US"/>
           </a:p>
@@ -2392,7 +2392,7 @@
           <a:p>
             <a:fld id="{1BA27EB7-94DC-414F-A9E6-532764B50347}" type="datetimeFigureOut">
               <a:rPr lang="ko-KR" altLang="en-US" smtClean="0"/>
-              <a:t>2025-05-09</a:t>
+              <a:t>2025-05-10</a:t>
             </a:fld>
             <a:endParaRPr lang="ko-KR" altLang="en-US"/>
           </a:p>
@@ -2505,7 +2505,7 @@
           <a:p>
             <a:fld id="{1BA27EB7-94DC-414F-A9E6-532764B50347}" type="datetimeFigureOut">
               <a:rPr lang="ko-KR" altLang="en-US" smtClean="0"/>
-              <a:t>2025-05-09</a:t>
+              <a:t>2025-05-10</a:t>
             </a:fld>
             <a:endParaRPr lang="ko-KR" altLang="en-US"/>
           </a:p>
@@ -2816,7 +2816,7 @@
           <a:p>
             <a:fld id="{1BA27EB7-94DC-414F-A9E6-532764B50347}" type="datetimeFigureOut">
               <a:rPr lang="ko-KR" altLang="en-US" smtClean="0"/>
-              <a:t>2025-05-09</a:t>
+              <a:t>2025-05-10</a:t>
             </a:fld>
             <a:endParaRPr lang="ko-KR" altLang="en-US"/>
           </a:p>
@@ -3104,7 +3104,7 @@
           <a:p>
             <a:fld id="{1BA27EB7-94DC-414F-A9E6-532764B50347}" type="datetimeFigureOut">
               <a:rPr lang="ko-KR" altLang="en-US" smtClean="0"/>
-              <a:t>2025-05-09</a:t>
+              <a:t>2025-05-10</a:t>
             </a:fld>
             <a:endParaRPr lang="ko-KR" altLang="en-US"/>
           </a:p>
@@ -3345,7 +3345,7 @@
           <a:p>
             <a:fld id="{1BA27EB7-94DC-414F-A9E6-532764B50347}" type="datetimeFigureOut">
               <a:rPr lang="ko-KR" altLang="en-US" smtClean="0"/>
-              <a:t>2025-05-09</a:t>
+              <a:t>2025-05-10</a:t>
             </a:fld>
             <a:endParaRPr lang="ko-KR" altLang="en-US"/>
           </a:p>
@@ -3825,10 +3825,26 @@
           <a:lstStyle/>
           <a:p>
             <a:r>
+              <a:rPr lang="en-US" altLang="ko-KR" b="1"/>
+              <a:t>BOLD</a:t>
+            </a:r>
+            <a:r>
               <a:rPr lang="en-US" altLang="ko-KR"/>
-              <a:t>hello ${Subtitle} world</a:t>
-            </a:r>
-            <a:endParaRPr lang="ko-KR" altLang="en-US"/>
+              <a:t> </a:t>
+            </a:r>
+            <a:r>
+              <a:rPr lang="en-US" altLang="ko-KR" sz="1600"/>
+              <a:t>${Subtitle}</a:t>
+            </a:r>
+            <a:r>
+              <a:rPr lang="en-US" altLang="ko-KR"/>
+              <a:t> </a:t>
+            </a:r>
+            <a:r>
+              <a:rPr lang="en-US" altLang="ko-KR" i="1"/>
+              <a:t>Italic</a:t>
+            </a:r>
+            <a:endParaRPr lang="ko-KR" altLang="en-US" i="1"/>
           </a:p>
         </p:txBody>
       </p:sp>
@@ -3862,8 +3878,12 @@
           <a:p>
             <a:pPr algn="r"/>
             <a:r>
+              <a:rPr lang="en-US" altLang="ko-KR" i="1"/>
+              <a:t>Created By: </a:t>
+            </a:r>
+            <a:r>
               <a:rPr lang="en-US" altLang="ko-KR" b="1" i="1"/>
-              <a:t>Created By: ${Date:yyyy-MM-dd}</a:t>
+              <a:t>${Date:yyyy-MM-dd}</a:t>
             </a:r>
             <a:endParaRPr lang="ko-KR" altLang="en-US" b="1" i="1"/>
           </a:p>

</xml_diff>